<commit_message>
Update Part 1: LLM comparison with latest GPT-5.2 models
</commit_message>
<xml_diff>
--- a/part1-presentation/maccabi-ai-presentation.pptx
+++ b/part1-presentation/maccabi-ai-presentation.pptx
@@ -6232,7 +6232,7 @@
                   <a:cs typeface="Radley"/>
                   <a:sym typeface="Radley"/>
                 </a:rPr>
-                <a:t>GPT-4o</a:t>
+                <a:t>GPT-4o Mini</a:t>
               </a:r>
             </a:p>
           </p:txBody>
@@ -6274,7 +6274,32 @@
                   <a:sym typeface="Carlito"/>
                   <a:rtl val="true"/>
                 </a:rPr>
-                <a:t>המודל המתקדם ביותר עם דיוק גבוה</a:t>
+                <a:t>מודל חשיבה (</a:t>
+              </a:r>
+              <a:r>
+                <a:rPr lang="en-US" sz="1999">
+                  <a:solidFill>
+                    <a:srgbClr val="333333"/>
+                  </a:solidFill>
+                  <a:latin typeface="Carlito"/>
+                  <a:ea typeface="Carlito"/>
+                  <a:cs typeface="Carlito"/>
+                  <a:sym typeface="Carlito"/>
+                </a:rPr>
+                <a:t>reasoning</a:t>
+              </a:r>
+              <a:r>
+                <a:rPr lang="he-IL" sz="1999">
+                  <a:solidFill>
+                    <a:srgbClr val="333333"/>
+                  </a:solidFill>
+                  <a:latin typeface="Carlito"/>
+                  <a:ea typeface="Carlito"/>
+                  <a:cs typeface="Carlito"/>
+                  <a:sym typeface="Carlito"/>
+                  <a:rtl val="true"/>
+                </a:rPr>
+                <a:t>) קטן ומהיר</a:t>
               </a:r>
             </a:p>
             <a:p>
@@ -6301,7 +6326,7 @@
                   <a:sym typeface="Carlito"/>
                   <a:rtl val="true"/>
                 </a:rPr>
-                <a:t>יתרונות:</a:t>
+                <a:t> יתרונות: </a:t>
               </a:r>
             </a:p>
             <a:p>
@@ -6321,7 +6346,7 @@
                   <a:sym typeface="Carlito"/>
                   <a:rtl val="true"/>
                 </a:rPr>
-                <a:t>- הכי חכם ומדויק</a:t>
+                <a:t>- מצוין למתמטיקה וקוד </a:t>
               </a:r>
             </a:p>
             <a:p>
@@ -6341,7 +6366,7 @@
                   <a:sym typeface="Carlito"/>
                   <a:rtl val="true"/>
                 </a:rPr>
-                <a:t>- יכולת הסקה והבנה מעולה</a:t>
+                <a:t>- מהיר וזול </a:t>
               </a:r>
             </a:p>
             <a:p>
@@ -6361,7 +6386,7 @@
                   <a:sym typeface="Carlito"/>
                   <a:rtl val="true"/>
                 </a:rPr>
-                <a:t>- מתאים למשימות מורכבות</a:t>
+                <a:t>- יכולת חשיבה עמוקה </a:t>
               </a:r>
             </a:p>
             <a:p>
@@ -6388,7 +6413,7 @@
                   <a:sym typeface="Carlito"/>
                   <a:rtl val="true"/>
                 </a:rPr>
-                <a:t>חסרונות:</a:t>
+                <a:t>חסרונות: </a:t>
               </a:r>
             </a:p>
             <a:p>
@@ -6408,7 +6433,7 @@
                   <a:sym typeface="Carlito"/>
                   <a:rtl val="true"/>
                 </a:rPr>
-                <a:t>- יקר יותר ואיטי יחסית</a:t>
+                <a:t>- פחות טוב במשימות לא-טכניות </a:t>
               </a:r>
             </a:p>
             <a:p>
@@ -6435,7 +6460,7 @@
                   <a:sym typeface="Carlito"/>
                   <a:rtl val="true"/>
                 </a:rPr>
-                <a:t>עלות: $$$</a:t>
+                <a:t>עלות: $</a:t>
               </a:r>
             </a:p>
           </p:txBody>
@@ -6494,7 +6519,7 @@
                   <a:cs typeface="Radley"/>
                   <a:sym typeface="Radley"/>
                 </a:rPr>
-                <a:t>GPT-4.1</a:t>
+                <a:t>GPT-5.1</a:t>
               </a:r>
             </a:p>
           </p:txBody>
@@ -6539,7 +6564,7 @@
                   <a:sym typeface="Carlito"/>
                   <a:rtl val="true"/>
                 </a:rPr>
-                <a:t>משופר עם יכולות חדשות ויתרונות</a:t>
+                <a:t>מודל דגל קודם, עדיין חזק מאוד</a:t>
               </a:r>
             </a:p>
             <a:p>
@@ -6595,7 +6620,85 @@
                   <a:sym typeface="Carlito"/>
                   <a:rtl val="true"/>
                 </a:rPr>
-                <a:t>- הגרסה החדשה ביותר</a:t>
+                <a:t>- ב</a:t>
+              </a:r>
+              <a:r>
+                <a:rPr lang="he-IL" sz="1999" strike="noStrike" u="none">
+                  <a:solidFill>
+                    <a:srgbClr val="333333"/>
+                  </a:solidFill>
+                  <a:latin typeface="Carlito"/>
+                  <a:ea typeface="Carlito"/>
+                  <a:cs typeface="Carlito"/>
+                  <a:sym typeface="Carlito"/>
+                  <a:rtl val="true"/>
+                </a:rPr>
+                <a:t>י</a:t>
+              </a:r>
+              <a:r>
+                <a:rPr lang="he-IL" sz="1999" strike="noStrike" u="none">
+                  <a:solidFill>
+                    <a:srgbClr val="333333"/>
+                  </a:solidFill>
+                  <a:latin typeface="Carlito"/>
+                  <a:ea typeface="Carlito"/>
+                  <a:cs typeface="Carlito"/>
+                  <a:sym typeface="Carlito"/>
+                  <a:rtl val="true"/>
+                </a:rPr>
+                <a:t>צ</a:t>
+              </a:r>
+              <a:r>
+                <a:rPr lang="he-IL" sz="1999" strike="noStrike" u="none">
+                  <a:solidFill>
+                    <a:srgbClr val="333333"/>
+                  </a:solidFill>
+                  <a:latin typeface="Carlito"/>
+                  <a:ea typeface="Carlito"/>
+                  <a:cs typeface="Carlito"/>
+                  <a:sym typeface="Carlito"/>
+                  <a:rtl val="true"/>
+                </a:rPr>
+                <a:t>ו</a:t>
+              </a:r>
+              <a:r>
+                <a:rPr lang="he-IL" sz="1999" strike="noStrike" u="none">
+                  <a:solidFill>
+                    <a:srgbClr val="333333"/>
+                  </a:solidFill>
+                  <a:latin typeface="Carlito"/>
+                  <a:ea typeface="Carlito"/>
+                  <a:cs typeface="Carlito"/>
+                  <a:sym typeface="Carlito"/>
+                  <a:rtl val="true"/>
+                </a:rPr>
+                <a:t>עים מע</a:t>
+              </a:r>
+              <a:r>
+                <a:rPr lang="he-IL" sz="1999" strike="noStrike" u="none">
+                  <a:solidFill>
+                    <a:srgbClr val="333333"/>
+                  </a:solidFill>
+                  <a:latin typeface="Carlito"/>
+                  <a:ea typeface="Carlito"/>
+                  <a:cs typeface="Carlito"/>
+                  <a:sym typeface="Carlito"/>
+                  <a:rtl val="true"/>
+                </a:rPr>
+                <a:t>ו</a:t>
+              </a:r>
+              <a:r>
+                <a:rPr lang="he-IL" sz="1999" strike="noStrike" u="none">
+                  <a:solidFill>
+                    <a:srgbClr val="333333"/>
+                  </a:solidFill>
+                  <a:latin typeface="Carlito"/>
+                  <a:ea typeface="Carlito"/>
+                  <a:cs typeface="Carlito"/>
+                  <a:sym typeface="Carlito"/>
+                  <a:rtl val="true"/>
+                </a:rPr>
+                <a:t>לים</a:t>
               </a:r>
             </a:p>
             <a:p>
@@ -6608,6 +6711,19 @@
                 </a:spcBef>
               </a:pPr>
               <a:r>
+                <a:rPr lang="ar-EG" sz="1999" strike="noStrike" u="none">
+                  <a:solidFill>
+                    <a:srgbClr val="333333"/>
+                  </a:solidFill>
+                  <a:latin typeface="Carlito"/>
+                  <a:ea typeface="Carlito"/>
+                  <a:cs typeface="Carlito"/>
+                  <a:sym typeface="Carlito"/>
+                  <a:rtl val="true"/>
+                </a:rPr>
+                <a:t>- </a:t>
+              </a:r>
+              <a:r>
                 <a:rPr lang="he-IL" sz="1999" strike="noStrike" u="none">
                   <a:solidFill>
                     <a:srgbClr val="333333"/>
@@ -6618,7 +6734,159 @@
                   <a:sym typeface="Carlito"/>
                   <a:rtl val="true"/>
                 </a:rPr>
-                <a:t>- דיוק משופר</a:t>
+                <a:t>מ</a:t>
+              </a:r>
+              <a:r>
+                <a:rPr lang="he-IL" sz="1999" strike="noStrike" u="none">
+                  <a:solidFill>
+                    <a:srgbClr val="333333"/>
+                  </a:solidFill>
+                  <a:latin typeface="Carlito"/>
+                  <a:ea typeface="Carlito"/>
+                  <a:cs typeface="Carlito"/>
+                  <a:sym typeface="Carlito"/>
+                  <a:rtl val="true"/>
+                </a:rPr>
+                <a:t>ה</a:t>
+              </a:r>
+              <a:r>
+                <a:rPr lang="he-IL" sz="1999" strike="noStrike" u="none">
+                  <a:solidFill>
+                    <a:srgbClr val="333333"/>
+                  </a:solidFill>
+                  <a:latin typeface="Carlito"/>
+                  <a:ea typeface="Carlito"/>
+                  <a:cs typeface="Carlito"/>
+                  <a:sym typeface="Carlito"/>
+                  <a:rtl val="true"/>
+                </a:rPr>
+                <a:t>י</a:t>
+              </a:r>
+              <a:r>
+                <a:rPr lang="he-IL" sz="1999" strike="noStrike" u="none">
+                  <a:solidFill>
+                    <a:srgbClr val="333333"/>
+                  </a:solidFill>
+                  <a:latin typeface="Carlito"/>
+                  <a:ea typeface="Carlito"/>
+                  <a:cs typeface="Carlito"/>
+                  <a:sym typeface="Carlito"/>
+                  <a:rtl val="true"/>
+                </a:rPr>
+                <a:t>ר יותר</a:t>
+              </a:r>
+              <a:r>
+                <a:rPr lang="he-IL" sz="1999" strike="noStrike" u="none">
+                  <a:solidFill>
+                    <a:srgbClr val="333333"/>
+                  </a:solidFill>
+                  <a:latin typeface="Carlito"/>
+                  <a:ea typeface="Carlito"/>
+                  <a:cs typeface="Carlito"/>
+                  <a:sym typeface="Carlito"/>
+                  <a:rtl val="true"/>
+                </a:rPr>
+                <a:t> מ-</a:t>
+              </a:r>
+              <a:r>
+                <a:rPr lang="en-US" sz="1999" strike="noStrike" u="none">
+                  <a:solidFill>
+                    <a:srgbClr val="333333"/>
+                  </a:solidFill>
+                  <a:latin typeface="Carlito"/>
+                  <a:ea typeface="Carlito"/>
+                  <a:cs typeface="Carlito"/>
+                  <a:sym typeface="Carlito"/>
+                </a:rPr>
+                <a:t>5.2</a:t>
+              </a:r>
+            </a:p>
+            <a:p>
+              <a:pPr algn="r" rtl="true" marL="0" indent="0" lvl="0">
+                <a:lnSpc>
+                  <a:spcPts val="2799"/>
+                </a:lnSpc>
+                <a:spcBef>
+                  <a:spcPct val="0"/>
+                </a:spcBef>
+              </a:pPr>
+              <a:r>
+                <a:rPr lang="he-IL" sz="1999" strike="noStrike" u="none">
+                  <a:solidFill>
+                    <a:srgbClr val="333333"/>
+                  </a:solidFill>
+                  <a:latin typeface="Carlito"/>
+                  <a:ea typeface="Carlito"/>
+                  <a:cs typeface="Carlito"/>
+                  <a:sym typeface="Carlito"/>
+                  <a:rtl val="true"/>
+                </a:rPr>
+                <a:t>- י</a:t>
+              </a:r>
+              <a:r>
+                <a:rPr lang="he-IL" sz="1999" strike="noStrike" u="none">
+                  <a:solidFill>
+                    <a:srgbClr val="333333"/>
+                  </a:solidFill>
+                  <a:latin typeface="Carlito"/>
+                  <a:ea typeface="Carlito"/>
+                  <a:cs typeface="Carlito"/>
+                  <a:sym typeface="Carlito"/>
+                  <a:rtl val="true"/>
+                </a:rPr>
+                <a:t>ציב </a:t>
+              </a:r>
+              <a:r>
+                <a:rPr lang="he-IL" sz="1999" strike="noStrike" u="none">
+                  <a:solidFill>
+                    <a:srgbClr val="333333"/>
+                  </a:solidFill>
+                  <a:latin typeface="Carlito"/>
+                  <a:ea typeface="Carlito"/>
+                  <a:cs typeface="Carlito"/>
+                  <a:sym typeface="Carlito"/>
+                  <a:rtl val="true"/>
+                </a:rPr>
+                <a:t>ו</a:t>
+              </a:r>
+              <a:r>
+                <a:rPr lang="he-IL" sz="1999" strike="noStrike" u="none">
+                  <a:solidFill>
+                    <a:srgbClr val="333333"/>
+                  </a:solidFill>
+                  <a:latin typeface="Carlito"/>
+                  <a:ea typeface="Carlito"/>
+                  <a:cs typeface="Carlito"/>
+                  <a:sym typeface="Carlito"/>
+                  <a:rtl val="true"/>
+                </a:rPr>
+                <a:t>נבד</a:t>
+              </a:r>
+              <a:r>
+                <a:rPr lang="he-IL" sz="1999" strike="noStrike" u="none">
+                  <a:solidFill>
+                    <a:srgbClr val="333333"/>
+                  </a:solidFill>
+                  <a:latin typeface="Carlito"/>
+                  <a:ea typeface="Carlito"/>
+                  <a:cs typeface="Carlito"/>
+                  <a:sym typeface="Carlito"/>
+                  <a:rtl val="true"/>
+                </a:rPr>
+                <a:t>ק </a:t>
+              </a:r>
+              <a:r>
+                <a:rPr lang="he-IL" sz="1999" strike="noStrike" u="none">
+                  <a:solidFill>
+                    <a:srgbClr val="333333"/>
+                  </a:solidFill>
+                  <a:latin typeface="Carlito"/>
+                  <a:ea typeface="Carlito"/>
+                  <a:cs typeface="Carlito"/>
+                  <a:sym typeface="Carlito"/>
+                  <a:rtl val="true"/>
+                </a:rPr>
+                <a:t>היטב</a:t>
               </a:r>
             </a:p>
             <a:p>
@@ -6674,18 +6942,8 @@
                   <a:sym typeface="Carlito"/>
                   <a:rtl val="true"/>
                 </a:rPr>
-                <a:t>- חדש = פחות נבדק בשטח</a:t>
-              </a:r>
-            </a:p>
-            <a:p>
-              <a:pPr algn="r" rtl="true" marL="0" indent="0" lvl="0">
-                <a:lnSpc>
-                  <a:spcPts val="2799"/>
-                </a:lnSpc>
-                <a:spcBef>
-                  <a:spcPct val="0"/>
-                </a:spcBef>
-              </a:pPr>
+                <a:t>- פחות </a:t>
+              </a:r>
               <a:r>
                 <a:rPr lang="he-IL" sz="1999" strike="noStrike" u="none">
                   <a:solidFill>
@@ -6697,7 +6955,162 @@
                   <a:sym typeface="Carlito"/>
                   <a:rtl val="true"/>
                 </a:rPr>
-                <a:t>- יקר</a:t>
+                <a:t>מ</a:t>
+              </a:r>
+              <a:r>
+                <a:rPr lang="he-IL" sz="1999" strike="noStrike" u="none">
+                  <a:solidFill>
+                    <a:srgbClr val="333333"/>
+                  </a:solidFill>
+                  <a:latin typeface="Carlito"/>
+                  <a:ea typeface="Carlito"/>
+                  <a:cs typeface="Carlito"/>
+                  <a:sym typeface="Carlito"/>
+                  <a:rtl val="true"/>
+                </a:rPr>
+                <a:t>ד</a:t>
+              </a:r>
+              <a:r>
+                <a:rPr lang="he-IL" sz="1999" strike="noStrike" u="none">
+                  <a:solidFill>
+                    <a:srgbClr val="333333"/>
+                  </a:solidFill>
+                  <a:latin typeface="Carlito"/>
+                  <a:ea typeface="Carlito"/>
+                  <a:cs typeface="Carlito"/>
+                  <a:sym typeface="Carlito"/>
+                  <a:rtl val="true"/>
+                </a:rPr>
+                <a:t>וי</a:t>
+              </a:r>
+              <a:r>
+                <a:rPr lang="he-IL" sz="1999" strike="noStrike" u="none">
+                  <a:solidFill>
+                    <a:srgbClr val="333333"/>
+                  </a:solidFill>
+                  <a:latin typeface="Carlito"/>
+                  <a:ea typeface="Carlito"/>
+                  <a:cs typeface="Carlito"/>
+                  <a:sym typeface="Carlito"/>
+                  <a:rtl val="true"/>
+                </a:rPr>
+                <a:t>ק </a:t>
+              </a:r>
+              <a:r>
+                <a:rPr lang="he-IL" sz="1999" strike="noStrike" u="none">
+                  <a:solidFill>
+                    <a:srgbClr val="333333"/>
+                  </a:solidFill>
+                  <a:latin typeface="Carlito"/>
+                  <a:ea typeface="Carlito"/>
+                  <a:cs typeface="Carlito"/>
+                  <a:sym typeface="Carlito"/>
+                  <a:rtl val="true"/>
+                </a:rPr>
+                <a:t>מ</a:t>
+              </a:r>
+              <a:r>
+                <a:rPr lang="ar-EG" sz="1999" strike="noStrike" u="none">
+                  <a:solidFill>
+                    <a:srgbClr val="333333"/>
+                  </a:solidFill>
+                  <a:latin typeface="Carlito"/>
+                  <a:ea typeface="Carlito"/>
+                  <a:cs typeface="Carlito"/>
+                  <a:sym typeface="Carlito"/>
+                  <a:rtl val="true"/>
+                </a:rPr>
+                <a:t>-</a:t>
+              </a:r>
+              <a:r>
+                <a:rPr lang="en-US" sz="1999" strike="noStrike" u="none">
+                  <a:solidFill>
+                    <a:srgbClr val="333333"/>
+                  </a:solidFill>
+                  <a:latin typeface="Carlito"/>
+                  <a:ea typeface="Carlito"/>
+                  <a:cs typeface="Carlito"/>
+                  <a:sym typeface="Carlito"/>
+                </a:rPr>
+                <a:t>5.2</a:t>
+              </a:r>
+              <a:r>
+                <a:rPr lang="ar-EG" sz="1999" strike="noStrike" u="none">
+                  <a:solidFill>
+                    <a:srgbClr val="333333"/>
+                  </a:solidFill>
+                  <a:latin typeface="Carlito"/>
+                  <a:ea typeface="Carlito"/>
+                  <a:cs typeface="Carlito"/>
+                  <a:sym typeface="Carlito"/>
+                  <a:rtl val="true"/>
+                </a:rPr>
+                <a:t> </a:t>
+              </a:r>
+              <a:r>
+                <a:rPr lang="he-IL" sz="1999" strike="noStrike" u="none">
+                  <a:solidFill>
+                    <a:srgbClr val="333333"/>
+                  </a:solidFill>
+                  <a:latin typeface="Carlito"/>
+                  <a:ea typeface="Carlito"/>
+                  <a:cs typeface="Carlito"/>
+                  <a:sym typeface="Carlito"/>
+                  <a:rtl val="true"/>
+                </a:rPr>
+                <a:t>במש</a:t>
+              </a:r>
+              <a:r>
+                <a:rPr lang="he-IL" sz="1999" strike="noStrike" u="none">
+                  <a:solidFill>
+                    <a:srgbClr val="333333"/>
+                  </a:solidFill>
+                  <a:latin typeface="Carlito"/>
+                  <a:ea typeface="Carlito"/>
+                  <a:cs typeface="Carlito"/>
+                  <a:sym typeface="Carlito"/>
+                  <a:rtl val="true"/>
+                </a:rPr>
+                <a:t>י</a:t>
+              </a:r>
+              <a:r>
+                <a:rPr lang="he-IL" sz="1999" strike="noStrike" u="none">
+                  <a:solidFill>
+                    <a:srgbClr val="333333"/>
+                  </a:solidFill>
+                  <a:latin typeface="Carlito"/>
+                  <a:ea typeface="Carlito"/>
+                  <a:cs typeface="Carlito"/>
+                  <a:sym typeface="Carlito"/>
+                  <a:rtl val="true"/>
+                </a:rPr>
+                <a:t>מות מו</a:t>
+              </a:r>
+              <a:r>
+                <a:rPr lang="he-IL" sz="1999" strike="noStrike" u="none">
+                  <a:solidFill>
+                    <a:srgbClr val="333333"/>
+                  </a:solidFill>
+                  <a:latin typeface="Carlito"/>
+                  <a:ea typeface="Carlito"/>
+                  <a:cs typeface="Carlito"/>
+                  <a:sym typeface="Carlito"/>
+                  <a:rtl val="true"/>
+                </a:rPr>
+                <a:t>ר</a:t>
+              </a:r>
+              <a:r>
+                <a:rPr lang="he-IL" sz="1999" strike="noStrike" u="none">
+                  <a:solidFill>
+                    <a:srgbClr val="333333"/>
+                  </a:solidFill>
+                  <a:latin typeface="Carlito"/>
+                  <a:ea typeface="Carlito"/>
+                  <a:cs typeface="Carlito"/>
+                  <a:sym typeface="Carlito"/>
+                  <a:rtl val="true"/>
+                </a:rPr>
+                <a:t>כבות</a:t>
               </a:r>
             </a:p>
             <a:p>
@@ -6789,7 +7202,20 @@
                   <a:cs typeface="Radley"/>
                   <a:sym typeface="Radley"/>
                 </a:rPr>
-                <a:t>GPT-4o Mini</a:t>
+                <a:t>GPT-4o</a:t>
+              </a:r>
+              <a:r>
+                <a:rPr lang="ar-EG" sz="2799">
+                  <a:solidFill>
+                    <a:srgbClr val="00897B"/>
+                  </a:solidFill>
+                  <a:latin typeface="Radley"/>
+                  <a:ea typeface="Radley"/>
+                  <a:cs typeface="Radley"/>
+                  <a:sym typeface="Radley"/>
+                  <a:rtl val="true"/>
+                </a:rPr>
+                <a:t> </a:t>
               </a:r>
             </a:p>
           </p:txBody>
@@ -6824,6 +7250,19 @@
                 </a:spcBef>
               </a:pPr>
               <a:r>
+                <a:rPr lang="he-IL" sz="1999">
+                  <a:solidFill>
+                    <a:srgbClr val="333333"/>
+                  </a:solidFill>
+                  <a:latin typeface="Carlito"/>
+                  <a:ea typeface="Carlito"/>
+                  <a:cs typeface="Carlito"/>
+                  <a:sym typeface="Carlito"/>
+                  <a:rtl val="true"/>
+                </a:rPr>
+                <a:t>מודל</a:t>
+              </a:r>
+              <a:r>
                 <a:rPr lang="he-IL" sz="1999" strike="noStrike" u="none">
                   <a:solidFill>
                     <a:srgbClr val="333333"/>
@@ -6834,7 +7273,7 @@
                   <a:sym typeface="Carlito"/>
                   <a:rtl val="true"/>
                 </a:rPr>
-                <a:t>גרסה מוקטנת עם עלות נמוכה</a:t>
+                <a:t> מולטימודלי (טקסט, תמונה, קול) </a:t>
               </a:r>
             </a:p>
             <a:p>
@@ -6869,6 +7308,19 @@
                 </a:rPr>
                 <a:t>יתרונות:</a:t>
               </a:r>
+              <a:r>
+                <a:rPr lang="ar-EG" sz="1999" strike="noStrike" u="none">
+                  <a:solidFill>
+                    <a:srgbClr val="333333"/>
+                  </a:solidFill>
+                  <a:latin typeface="Carlito"/>
+                  <a:ea typeface="Carlito"/>
+                  <a:cs typeface="Carlito"/>
+                  <a:sym typeface="Carlito"/>
+                  <a:rtl val="true"/>
+                </a:rPr>
+                <a:t> </a:t>
+              </a:r>
             </a:p>
             <a:p>
               <a:pPr algn="r" rtl="true" marL="0" indent="0" lvl="0">
@@ -6890,7 +7342,72 @@
                   <a:sym typeface="Carlito"/>
                   <a:rtl val="true"/>
                 </a:rPr>
-                <a:t>- איזון טוב בין מחיר לביצועים</a:t>
+                <a:t>- איזון </a:t>
+              </a:r>
+              <a:r>
+                <a:rPr lang="he-IL" sz="1999" strike="noStrike" u="none">
+                  <a:solidFill>
+                    <a:srgbClr val="333333"/>
+                  </a:solidFill>
+                  <a:latin typeface="Carlito"/>
+                  <a:ea typeface="Carlito"/>
+                  <a:cs typeface="Carlito"/>
+                  <a:sym typeface="Carlito"/>
+                  <a:rtl val="true"/>
+                </a:rPr>
+                <a:t>מצ</a:t>
+              </a:r>
+              <a:r>
+                <a:rPr lang="he-IL" sz="1999" strike="noStrike" u="none">
+                  <a:solidFill>
+                    <a:srgbClr val="333333"/>
+                  </a:solidFill>
+                  <a:latin typeface="Carlito"/>
+                  <a:ea typeface="Carlito"/>
+                  <a:cs typeface="Carlito"/>
+                  <a:sym typeface="Carlito"/>
+                  <a:rtl val="true"/>
+                </a:rPr>
+                <a:t>ו</a:t>
+              </a:r>
+              <a:r>
+                <a:rPr lang="he-IL" sz="1999" strike="noStrike" u="none">
+                  <a:solidFill>
+                    <a:srgbClr val="333333"/>
+                  </a:solidFill>
+                  <a:latin typeface="Carlito"/>
+                  <a:ea typeface="Carlito"/>
+                  <a:cs typeface="Carlito"/>
+                  <a:sym typeface="Carlito"/>
+                  <a:rtl val="true"/>
+                </a:rPr>
+                <a:t>ין</a:t>
+              </a:r>
+              <a:r>
+                <a:rPr lang="he-IL" sz="1999" strike="noStrike" u="none">
+                  <a:solidFill>
+                    <a:srgbClr val="333333"/>
+                  </a:solidFill>
+                  <a:latin typeface="Carlito"/>
+                  <a:ea typeface="Carlito"/>
+                  <a:cs typeface="Carlito"/>
+                  <a:sym typeface="Carlito"/>
+                  <a:rtl val="true"/>
+                </a:rPr>
+                <a:t> בין מחיר לביצועים</a:t>
+              </a:r>
+              <a:r>
+                <a:rPr lang="ar-EG" sz="1999" strike="noStrike" u="none">
+                  <a:solidFill>
+                    <a:srgbClr val="333333"/>
+                  </a:solidFill>
+                  <a:latin typeface="Carlito"/>
+                  <a:ea typeface="Carlito"/>
+                  <a:cs typeface="Carlito"/>
+                  <a:sym typeface="Carlito"/>
+                  <a:rtl val="true"/>
+                </a:rPr>
+                <a:t> </a:t>
               </a:r>
             </a:p>
             <a:p>
@@ -6913,7 +7430,69 @@
                   <a:sym typeface="Carlito"/>
                   <a:rtl val="true"/>
                 </a:rPr>
-                <a:t>- מהיר וחסכוני</a:t>
+                <a:t>- תמיכה בתמונות וקול </a:t>
+              </a:r>
+            </a:p>
+            <a:p>
+              <a:pPr algn="r" rtl="true" marL="0" indent="0" lvl="0">
+                <a:lnSpc>
+                  <a:spcPts val="2799"/>
+                </a:lnSpc>
+                <a:spcBef>
+                  <a:spcPct val="0"/>
+                </a:spcBef>
+              </a:pPr>
+              <a:r>
+                <a:rPr lang="he-IL" sz="1999" strike="noStrike" u="none">
+                  <a:solidFill>
+                    <a:srgbClr val="333333"/>
+                  </a:solidFill>
+                  <a:latin typeface="Carlito"/>
+                  <a:ea typeface="Carlito"/>
+                  <a:cs typeface="Carlito"/>
+                  <a:sym typeface="Carlito"/>
+                  <a:rtl val="true"/>
+                </a:rPr>
+                <a:t>- מהיר ו</a:t>
+              </a:r>
+              <a:r>
+                <a:rPr lang="he-IL" sz="1999" strike="noStrike" u="none">
+                  <a:solidFill>
+                    <a:srgbClr val="333333"/>
+                  </a:solidFill>
+                  <a:latin typeface="Carlito"/>
+                  <a:ea typeface="Carlito"/>
+                  <a:cs typeface="Carlito"/>
+                  <a:sym typeface="Carlito"/>
+                  <a:rtl val="true"/>
+                </a:rPr>
+                <a:t>אמ</a:t>
+              </a:r>
+              <a:r>
+                <a:rPr lang="he-IL" sz="1999" strike="noStrike" u="none">
+                  <a:solidFill>
+                    <a:srgbClr val="333333"/>
+                  </a:solidFill>
+                  <a:latin typeface="Carlito"/>
+                  <a:ea typeface="Carlito"/>
+                  <a:cs typeface="Carlito"/>
+                  <a:sym typeface="Carlito"/>
+                  <a:rtl val="true"/>
+                </a:rPr>
+                <a:t>י</a:t>
+              </a:r>
+              <a:r>
+                <a:rPr lang="he-IL" sz="1999" strike="noStrike" u="none">
+                  <a:solidFill>
+                    <a:srgbClr val="333333"/>
+                  </a:solidFill>
+                  <a:latin typeface="Carlito"/>
+                  <a:ea typeface="Carlito"/>
+                  <a:cs typeface="Carlito"/>
+                  <a:sym typeface="Carlito"/>
+                  <a:rtl val="true"/>
+                </a:rPr>
+                <a:t>ן </a:t>
               </a:r>
             </a:p>
             <a:p>
@@ -6948,6 +7527,19 @@
                 </a:rPr>
                 <a:t>חסרונות:</a:t>
               </a:r>
+              <a:r>
+                <a:rPr lang="ar-EG" sz="1999" strike="noStrike" u="none">
+                  <a:solidFill>
+                    <a:srgbClr val="333333"/>
+                  </a:solidFill>
+                  <a:latin typeface="Carlito"/>
+                  <a:ea typeface="Carlito"/>
+                  <a:cs typeface="Carlito"/>
+                  <a:sym typeface="Carlito"/>
+                  <a:rtl val="true"/>
+                </a:rPr>
+                <a:t> </a:t>
+              </a:r>
             </a:p>
             <a:p>
               <a:pPr algn="r" rtl="true" marL="0" indent="0" lvl="0">
@@ -6969,18 +7561,8 @@
                   <a:sym typeface="Carlito"/>
                   <a:rtl val="true"/>
                 </a:rPr>
-                <a:t>- פחות מדויק במקרים מורכבים</a:t>
-              </a:r>
-            </a:p>
-            <a:p>
-              <a:pPr algn="r" rtl="true" marL="0" indent="0" lvl="0">
-                <a:lnSpc>
-                  <a:spcPts val="2799"/>
-                </a:lnSpc>
-                <a:spcBef>
-                  <a:spcPct val="0"/>
-                </a:spcBef>
-              </a:pPr>
+                <a:t>- פחות </a:t>
+              </a:r>
               <a:r>
                 <a:rPr lang="he-IL" sz="1999" strike="noStrike" u="none">
                   <a:solidFill>
@@ -6992,7 +7574,71 @@
                   <a:sym typeface="Carlito"/>
                   <a:rtl val="true"/>
                 </a:rPr>
-                <a:t>- יכולת הסקה מוגבלת יותר</a:t>
+                <a:t>חכ</a:t>
+              </a:r>
+              <a:r>
+                <a:rPr lang="he-IL" sz="1999" strike="noStrike" u="none">
+                  <a:solidFill>
+                    <a:srgbClr val="333333"/>
+                  </a:solidFill>
+                  <a:latin typeface="Carlito"/>
+                  <a:ea typeface="Carlito"/>
+                  <a:cs typeface="Carlito"/>
+                  <a:sym typeface="Carlito"/>
+                  <a:rtl val="true"/>
+                </a:rPr>
+                <a:t>ם מ</a:t>
+              </a:r>
+              <a:r>
+                <a:rPr lang="he-IL" sz="1999" strike="noStrike" u="none">
+                  <a:solidFill>
+                    <a:srgbClr val="333333"/>
+                  </a:solidFill>
+                  <a:latin typeface="Carlito"/>
+                  <a:ea typeface="Carlito"/>
+                  <a:cs typeface="Carlito"/>
+                  <a:sym typeface="Carlito"/>
+                  <a:rtl val="true"/>
+                </a:rPr>
+                <a:t>סד</a:t>
+              </a:r>
+              <a:r>
+                <a:rPr lang="he-IL" sz="1999" strike="noStrike" u="none">
+                  <a:solidFill>
+                    <a:srgbClr val="333333"/>
+                  </a:solidFill>
+                  <a:latin typeface="Carlito"/>
+                  <a:ea typeface="Carlito"/>
+                  <a:cs typeface="Carlito"/>
+                  <a:sym typeface="Carlito"/>
+                  <a:rtl val="true"/>
+                </a:rPr>
+                <a:t>רת </a:t>
+              </a:r>
+              <a:r>
+                <a:rPr lang="en-US" sz="1999" strike="noStrike" u="none">
+                  <a:solidFill>
+                    <a:srgbClr val="333333"/>
+                  </a:solidFill>
+                  <a:latin typeface="Carlito"/>
+                  <a:ea typeface="Carlito"/>
+                  <a:cs typeface="Carlito"/>
+                  <a:sym typeface="Carlito"/>
+                </a:rPr>
+                <a:t>GPT-5</a:t>
+              </a:r>
+              <a:r>
+                <a:rPr lang="ar-EG" sz="1999" strike="noStrike" u="none">
+                  <a:solidFill>
+                    <a:srgbClr val="333333"/>
+                  </a:solidFill>
+                  <a:latin typeface="Carlito"/>
+                  <a:ea typeface="Carlito"/>
+                  <a:cs typeface="Carlito"/>
+                  <a:sym typeface="Carlito"/>
+                  <a:rtl val="true"/>
+                </a:rPr>
+                <a:t> </a:t>
               </a:r>
             </a:p>
             <a:p>
@@ -7271,10 +7917,10 @@
         </p:nvGrpSpPr>
         <p:grpSpPr>
           <a:xfrm rot="0">
-            <a:off x="666750" y="1728472"/>
-            <a:ext cx="4009696" cy="4352015"/>
+            <a:off x="101035" y="1728472"/>
+            <a:ext cx="4575410" cy="4352015"/>
             <a:chOff x="0" y="0"/>
-            <a:chExt cx="5346261" cy="5802686"/>
+            <a:chExt cx="6100547" cy="5802686"/>
           </a:xfrm>
         </p:grpSpPr>
         <p:sp>
@@ -7285,7 +7931,7 @@
           </p:nvSpPr>
           <p:spPr>
             <a:xfrm rot="0">
-              <a:off x="0" y="-57150"/>
+              <a:off x="754286" y="-57150"/>
               <a:ext cx="5346261" cy="622724"/>
             </a:xfrm>
             <a:prstGeom prst="rect">
@@ -7316,7 +7962,7 @@
                   <a:cs typeface="Radley"/>
                   <a:sym typeface="Radley"/>
                 </a:rPr>
-                <a:t>GPT-4.1 Mini</a:t>
+                <a:t>GPT-5.2</a:t>
               </a:r>
             </a:p>
           </p:txBody>
@@ -7330,7 +7976,7 @@
           <p:spPr>
             <a:xfrm rot="0">
               <a:off x="0" y="615794"/>
-              <a:ext cx="5346261" cy="5186892"/>
+              <a:ext cx="6100547" cy="5186892"/>
             </a:xfrm>
             <a:prstGeom prst="rect">
               <a:avLst/>
@@ -7361,7 +8007,7 @@
                   <a:sym typeface="Carlito"/>
                   <a:rtl val="true"/>
                 </a:rPr>
-                <a:t>גרסה קלה עם יתרונות נוספים</a:t>
+                <a:t>המודל המתקדם ביותר לעבודה מקצועית</a:t>
               </a:r>
             </a:p>
             <a:p>
@@ -7417,7 +8063,124 @@
                   <a:sym typeface="Carlito"/>
                   <a:rtl val="true"/>
                 </a:rPr>
-                <a:t>- מהיר מאוד והכי זול</a:t>
+                <a:t>- ה</a:t>
+              </a:r>
+              <a:r>
+                <a:rPr lang="he-IL" sz="1999" strike="noStrike" u="none">
+                  <a:solidFill>
+                    <a:srgbClr val="333333"/>
+                  </a:solidFill>
+                  <a:latin typeface="Carlito"/>
+                  <a:ea typeface="Carlito"/>
+                  <a:cs typeface="Carlito"/>
+                  <a:sym typeface="Carlito"/>
+                  <a:rtl val="true"/>
+                </a:rPr>
+                <a:t>כ</a:t>
+              </a:r>
+              <a:r>
+                <a:rPr lang="he-IL" sz="1999" strike="noStrike" u="none">
+                  <a:solidFill>
+                    <a:srgbClr val="333333"/>
+                  </a:solidFill>
+                  <a:latin typeface="Carlito"/>
+                  <a:ea typeface="Carlito"/>
+                  <a:cs typeface="Carlito"/>
+                  <a:sym typeface="Carlito"/>
+                  <a:rtl val="true"/>
+                </a:rPr>
+                <a:t>י </a:t>
+              </a:r>
+              <a:r>
+                <a:rPr lang="he-IL" sz="1999" strike="noStrike" u="none">
+                  <a:solidFill>
+                    <a:srgbClr val="333333"/>
+                  </a:solidFill>
+                  <a:latin typeface="Carlito"/>
+                  <a:ea typeface="Carlito"/>
+                  <a:cs typeface="Carlito"/>
+                  <a:sym typeface="Carlito"/>
+                  <a:rtl val="true"/>
+                </a:rPr>
+                <a:t>חכם </a:t>
+              </a:r>
+              <a:r>
+                <a:rPr lang="he-IL" sz="1999" strike="noStrike" u="none">
+                  <a:solidFill>
+                    <a:srgbClr val="333333"/>
+                  </a:solidFill>
+                  <a:latin typeface="Carlito"/>
+                  <a:ea typeface="Carlito"/>
+                  <a:cs typeface="Carlito"/>
+                  <a:sym typeface="Carlito"/>
+                  <a:rtl val="true"/>
+                </a:rPr>
+                <a:t>ו</a:t>
+              </a:r>
+              <a:r>
+                <a:rPr lang="he-IL" sz="1999" strike="noStrike" u="none">
+                  <a:solidFill>
+                    <a:srgbClr val="333333"/>
+                  </a:solidFill>
+                  <a:latin typeface="Carlito"/>
+                  <a:ea typeface="Carlito"/>
+                  <a:cs typeface="Carlito"/>
+                  <a:sym typeface="Carlito"/>
+                  <a:rtl val="true"/>
+                </a:rPr>
+                <a:t>מ</a:t>
+              </a:r>
+              <a:r>
+                <a:rPr lang="he-IL" sz="1999" strike="noStrike" u="none">
+                  <a:solidFill>
+                    <a:srgbClr val="333333"/>
+                  </a:solidFill>
+                  <a:latin typeface="Carlito"/>
+                  <a:ea typeface="Carlito"/>
+                  <a:cs typeface="Carlito"/>
+                  <a:sym typeface="Carlito"/>
+                  <a:rtl val="true"/>
+                </a:rPr>
+                <a:t>ד</a:t>
+              </a:r>
+              <a:r>
+                <a:rPr lang="he-IL" sz="1999" strike="noStrike" u="none">
+                  <a:solidFill>
+                    <a:srgbClr val="333333"/>
+                  </a:solidFill>
+                  <a:latin typeface="Carlito"/>
+                  <a:ea typeface="Carlito"/>
+                  <a:cs typeface="Carlito"/>
+                  <a:sym typeface="Carlito"/>
+                  <a:rtl val="true"/>
+                </a:rPr>
+                <a:t>ויק</a:t>
+              </a:r>
+              <a:r>
+                <a:rPr lang="he-IL" sz="1999" strike="noStrike" u="none">
+                  <a:solidFill>
+                    <a:srgbClr val="333333"/>
+                  </a:solidFill>
+                  <a:latin typeface="Carlito"/>
+                  <a:ea typeface="Carlito"/>
+                  <a:cs typeface="Carlito"/>
+                  <a:sym typeface="Carlito"/>
+                  <a:rtl val="true"/>
+                </a:rPr>
+                <a:t> כיו</a:t>
+              </a:r>
+              <a:r>
+                <a:rPr lang="he-IL" sz="1999" strike="noStrike" u="none">
+                  <a:solidFill>
+                    <a:srgbClr val="333333"/>
+                  </a:solidFill>
+                  <a:latin typeface="Carlito"/>
+                  <a:ea typeface="Carlito"/>
+                  <a:cs typeface="Carlito"/>
+                  <a:sym typeface="Carlito"/>
+                  <a:rtl val="true"/>
+                </a:rPr>
+                <a:t>ם</a:t>
               </a:r>
             </a:p>
             <a:p>
@@ -7430,6 +8193,19 @@
                 </a:spcBef>
               </a:pPr>
               <a:r>
+                <a:rPr lang="ar-EG" sz="1999" strike="noStrike" u="none">
+                  <a:solidFill>
+                    <a:srgbClr val="333333"/>
+                  </a:solidFill>
+                  <a:latin typeface="Carlito"/>
+                  <a:ea typeface="Carlito"/>
+                  <a:cs typeface="Carlito"/>
+                  <a:sym typeface="Carlito"/>
+                  <a:rtl val="true"/>
+                </a:rPr>
+                <a:t>- </a:t>
+              </a:r>
+              <a:r>
                 <a:rPr lang="he-IL" sz="1999" strike="noStrike" u="none">
                   <a:solidFill>
                     <a:srgbClr val="333333"/>
@@ -7440,7 +8216,59 @@
                   <a:sym typeface="Carlito"/>
                   <a:rtl val="true"/>
                 </a:rPr>
-                <a:t>- יעיל למשימות פשוטות</a:t>
+                <a:t>הבנת הקשר אר</a:t>
+              </a:r>
+              <a:r>
+                <a:rPr lang="he-IL" sz="1999" strike="noStrike" u="none">
+                  <a:solidFill>
+                    <a:srgbClr val="333333"/>
+                  </a:solidFill>
+                  <a:latin typeface="Carlito"/>
+                  <a:ea typeface="Carlito"/>
+                  <a:cs typeface="Carlito"/>
+                  <a:sym typeface="Carlito"/>
+                  <a:rtl val="true"/>
+                </a:rPr>
+                <a:t>ו</a:t>
+              </a:r>
+              <a:r>
+                <a:rPr lang="he-IL" sz="1999" strike="noStrike" u="none">
+                  <a:solidFill>
+                    <a:srgbClr val="333333"/>
+                  </a:solidFill>
+                  <a:latin typeface="Carlito"/>
+                  <a:ea typeface="Carlito"/>
+                  <a:cs typeface="Carlito"/>
+                  <a:sym typeface="Carlito"/>
+                  <a:rtl val="true"/>
+                </a:rPr>
+                <a:t>ך</a:t>
+              </a:r>
+              <a:r>
+                <a:rPr lang="ar-EG" sz="1999" strike="noStrike" u="none">
+                  <a:solidFill>
+                    <a:srgbClr val="333333"/>
+                  </a:solidFill>
+                  <a:latin typeface="Carlito"/>
+                  <a:ea typeface="Carlito"/>
+                  <a:cs typeface="Carlito"/>
+                  <a:sym typeface="Carlito"/>
+                  <a:rtl val="true"/>
+                </a:rPr>
+                <a:t> </a:t>
+              </a:r>
+              <a:r>
+                <a:rPr lang="he-IL" sz="1999" strike="noStrike" u="none">
+                  <a:solidFill>
+                    <a:srgbClr val="333333"/>
+                  </a:solidFill>
+                  <a:latin typeface="Carlito"/>
+                  <a:ea typeface="Carlito"/>
+                  <a:cs typeface="Carlito"/>
+                  <a:sym typeface="Carlito"/>
+                  <a:rtl val="true"/>
+                </a:rPr>
+                <a:t>ופחות הזיות</a:t>
               </a:r>
             </a:p>
             <a:p>
@@ -7496,7 +8324,85 @@
                   <a:sym typeface="Carlito"/>
                   <a:rtl val="true"/>
                 </a:rPr>
-                <a:t>- עלול לפספס ניואנסים</a:t>
+                <a:t>- ה</a:t>
+              </a:r>
+              <a:r>
+                <a:rPr lang="he-IL" sz="1999" strike="noStrike" u="none">
+                  <a:solidFill>
+                    <a:srgbClr val="333333"/>
+                  </a:solidFill>
+                  <a:latin typeface="Carlito"/>
+                  <a:ea typeface="Carlito"/>
+                  <a:cs typeface="Carlito"/>
+                  <a:sym typeface="Carlito"/>
+                  <a:rtl val="true"/>
+                </a:rPr>
+                <a:t>י</a:t>
+              </a:r>
+              <a:r>
+                <a:rPr lang="he-IL" sz="1999" strike="noStrike" u="none">
+                  <a:solidFill>
+                    <a:srgbClr val="333333"/>
+                  </a:solidFill>
+                  <a:latin typeface="Carlito"/>
+                  <a:ea typeface="Carlito"/>
+                  <a:cs typeface="Carlito"/>
+                  <a:sym typeface="Carlito"/>
+                  <a:rtl val="true"/>
+                </a:rPr>
+                <a:t>קר</a:t>
+              </a:r>
+              <a:r>
+                <a:rPr lang="ar-EG" sz="1999" strike="noStrike" u="none">
+                  <a:solidFill>
+                    <a:srgbClr val="333333"/>
+                  </a:solidFill>
+                  <a:latin typeface="Carlito"/>
+                  <a:ea typeface="Carlito"/>
+                  <a:cs typeface="Carlito"/>
+                  <a:sym typeface="Carlito"/>
+                  <a:rtl val="true"/>
+                </a:rPr>
+                <a:t> </a:t>
+              </a:r>
+              <a:r>
+                <a:rPr lang="he-IL" sz="1999" strike="noStrike" u="none">
+                  <a:solidFill>
+                    <a:srgbClr val="333333"/>
+                  </a:solidFill>
+                  <a:latin typeface="Carlito"/>
+                  <a:ea typeface="Carlito"/>
+                  <a:cs typeface="Carlito"/>
+                  <a:sym typeface="Carlito"/>
+                  <a:rtl val="true"/>
+                </a:rPr>
+                <a:t>ב</a:t>
+              </a:r>
+              <a:r>
+                <a:rPr lang="he-IL" sz="1999" strike="noStrike" u="none">
+                  <a:solidFill>
+                    <a:srgbClr val="333333"/>
+                  </a:solidFill>
+                  <a:latin typeface="Carlito"/>
+                  <a:ea typeface="Carlito"/>
+                  <a:cs typeface="Carlito"/>
+                  <a:sym typeface="Carlito"/>
+                  <a:rtl val="true"/>
+                </a:rPr>
+                <a:t>יות</a:t>
+              </a:r>
+              <a:r>
+                <a:rPr lang="he-IL" sz="1999" strike="noStrike" u="none">
+                  <a:solidFill>
+                    <a:srgbClr val="333333"/>
+                  </a:solidFill>
+                  <a:latin typeface="Carlito"/>
+                  <a:ea typeface="Carlito"/>
+                  <a:cs typeface="Carlito"/>
+                  <a:sym typeface="Carlito"/>
+                  <a:rtl val="true"/>
+                </a:rPr>
+                <a:t>ר</a:t>
               </a:r>
             </a:p>
             <a:p>
@@ -7519,7 +8425,46 @@
                   <a:sym typeface="Carlito"/>
                   <a:rtl val="true"/>
                 </a:rPr>
-                <a:t>- לא מתאים למשימות קריטיות</a:t>
+                <a:t>- חדש </a:t>
+              </a:r>
+              <a:r>
+                <a:rPr lang="he-IL" sz="1999" strike="noStrike" u="none">
+                  <a:solidFill>
+                    <a:srgbClr val="333333"/>
+                  </a:solidFill>
+                  <a:latin typeface="Carlito"/>
+                  <a:ea typeface="Carlito"/>
+                  <a:cs typeface="Carlito"/>
+                  <a:sym typeface="Carlito"/>
+                  <a:rtl val="true"/>
+                </a:rPr>
+                <a:t>י</a:t>
+              </a:r>
+              <a:r>
+                <a:rPr lang="he-IL" sz="1999" strike="noStrike" u="none">
+                  <a:solidFill>
+                    <a:srgbClr val="333333"/>
+                  </a:solidFill>
+                  <a:latin typeface="Carlito"/>
+                  <a:ea typeface="Carlito"/>
+                  <a:cs typeface="Carlito"/>
+                  <a:sym typeface="Carlito"/>
+                  <a:rtl val="true"/>
+                </a:rPr>
+                <a:t>חס</a:t>
+              </a:r>
+              <a:r>
+                <a:rPr lang="he-IL" sz="1999" strike="noStrike" u="none">
+                  <a:solidFill>
+                    <a:srgbClr val="333333"/>
+                  </a:solidFill>
+                  <a:latin typeface="Carlito"/>
+                  <a:ea typeface="Carlito"/>
+                  <a:cs typeface="Carlito"/>
+                  <a:sym typeface="Carlito"/>
+                  <a:rtl val="true"/>
+                </a:rPr>
+                <a:t>ית</a:t>
               </a:r>
             </a:p>
             <a:p>
@@ -7552,7 +8497,33 @@
                   <a:sym typeface="Carlito"/>
                   <a:rtl val="true"/>
                 </a:rPr>
-                <a:t>עלות: $</a:t>
+                <a:t>עלות: </a:t>
+              </a:r>
+              <a:r>
+                <a:rPr lang="ar-EG" sz="1999" strike="noStrike" u="none">
+                  <a:solidFill>
+                    <a:srgbClr val="333333"/>
+                  </a:solidFill>
+                  <a:latin typeface="Carlito"/>
+                  <a:ea typeface="Carlito"/>
+                  <a:cs typeface="Carlito"/>
+                  <a:sym typeface="Carlito"/>
+                  <a:rtl val="true"/>
+                </a:rPr>
+                <a:t>$$$</a:t>
+              </a:r>
+              <a:r>
+                <a:rPr lang="ar-EG" sz="1999" strike="noStrike" u="none">
+                  <a:solidFill>
+                    <a:srgbClr val="333333"/>
+                  </a:solidFill>
+                  <a:latin typeface="Carlito"/>
+                  <a:ea typeface="Carlito"/>
+                  <a:cs typeface="Carlito"/>
+                  <a:sym typeface="Carlito"/>
+                  <a:rtl val="true"/>
+                </a:rPr>
+                <a:t>$</a:t>
               </a:r>
             </a:p>
           </p:txBody>
@@ -7591,73 +8562,15 @@
         </p:nvGrpSpPr>
         <p:grpSpPr>
           <a:xfrm rot="0">
-            <a:off x="0" y="0"/>
-            <a:ext cx="7858125" cy="10287000"/>
+            <a:off x="10390385" y="666755"/>
+            <a:ext cx="7230865" cy="7077075"/>
             <a:chOff x="0" y="0"/>
-            <a:chExt cx="1217429" cy="1593725"/>
+            <a:chExt cx="9641153" cy="9436100"/>
           </a:xfrm>
         </p:grpSpPr>
         <p:sp>
           <p:nvSpPr>
-            <p:cNvPr name="Freeform 3" id="3"/>
-            <p:cNvSpPr/>
-            <p:nvPr/>
-          </p:nvSpPr>
-          <p:spPr>
-            <a:xfrm flipH="false" flipV="false" rot="0">
-              <a:off x="0" y="0"/>
-              <a:ext cx="1217429" cy="1593725"/>
-            </a:xfrm>
-            <a:custGeom>
-              <a:avLst/>
-              <a:gdLst/>
-              <a:ahLst/>
-              <a:cxnLst/>
-              <a:rect r="r" b="b" t="t" l="l"/>
-              <a:pathLst>
-                <a:path h="1593725" w="1217429">
-                  <a:moveTo>
-                    <a:pt x="1217429" y="0"/>
-                  </a:moveTo>
-                  <a:lnTo>
-                    <a:pt x="0" y="0"/>
-                  </a:lnTo>
-                  <a:lnTo>
-                    <a:pt x="0" y="1593725"/>
-                  </a:lnTo>
-                  <a:lnTo>
-                    <a:pt x="1217429" y="1593725"/>
-                  </a:lnTo>
-                  <a:close/>
-                </a:path>
-              </a:pathLst>
-            </a:custGeom>
-            <a:blipFill>
-              <a:blip r:embed="rId2"/>
-              <a:stretch>
-                <a:fillRect l="0" t="-255" r="0" b="-255"/>
-              </a:stretch>
-            </a:blipFill>
-          </p:spPr>
-        </p:sp>
-      </p:grpSp>
-      <p:grpSp>
-        <p:nvGrpSpPr>
-          <p:cNvPr name="Group 4" id="4"/>
-          <p:cNvGrpSpPr/>
-          <p:nvPr/>
-        </p:nvGrpSpPr>
-        <p:grpSpPr>
-          <a:xfrm rot="0">
-            <a:off x="10390385" y="666755"/>
-            <a:ext cx="7230865" cy="5857875"/>
-            <a:chOff x="0" y="0"/>
-            <a:chExt cx="9641153" cy="7810500"/>
-          </a:xfrm>
-        </p:grpSpPr>
-        <p:sp>
-          <p:nvSpPr>
-            <p:cNvPr name="TextBox 5" id="5"/>
+            <p:cNvPr name="TextBox 3" id="3"/>
             <p:cNvSpPr txBox="true"/>
             <p:nvPr/>
           </p:nvSpPr>
@@ -7702,7 +8615,7 @@
         </p:sp>
         <p:sp>
           <p:nvSpPr>
-            <p:cNvPr name="TextBox 6" id="6"/>
+            <p:cNvPr name="TextBox 4" id="4"/>
             <p:cNvSpPr txBox="true"/>
             <p:nvPr/>
           </p:nvSpPr>
@@ -7752,7 +8665,7 @@
                   <a:cs typeface="Radley"/>
                   <a:sym typeface="Radley"/>
                 </a:rPr>
-                <a:t>GPT-4o</a:t>
+                <a:t>GPT-5.2</a:t>
               </a:r>
               <a:r>
                 <a:rPr lang="he-IL" sz="3499" u="none">
@@ -7777,7 +8690,7 @@
                   <a:cs typeface="Radley"/>
                   <a:sym typeface="Radley"/>
                 </a:rPr>
-                <a:t>GPT-4o Mini</a:t>
+                <a:t>GPT-4o</a:t>
               </a:r>
               <a:r>
                 <a:rPr lang="he-IL" sz="3499" u="none">
@@ -7797,7 +8710,7 @@
         </p:sp>
         <p:sp>
           <p:nvSpPr>
-            <p:cNvPr name="AutoShape 7" id="7"/>
+            <p:cNvPr name="AutoShape 5" id="5"/>
             <p:cNvSpPr/>
             <p:nvPr/>
           </p:nvSpPr>
@@ -7821,14 +8734,14 @@
         </p:sp>
         <p:sp>
           <p:nvSpPr>
-            <p:cNvPr name="TextBox 8" id="8"/>
+            <p:cNvPr name="TextBox 6" id="6"/>
             <p:cNvSpPr txBox="true"/>
             <p:nvPr/>
           </p:nvSpPr>
           <p:spPr>
             <a:xfrm rot="0">
               <a:off x="26326" y="5740400"/>
-              <a:ext cx="9588500" cy="2070100"/>
+              <a:ext cx="9588500" cy="3695700"/>
             </a:xfrm>
             <a:prstGeom prst="rect">
               <a:avLst/>
@@ -7856,77 +8769,44 @@
                   <a:sym typeface="Carlito"/>
                   <a:rtl val="true"/>
                 </a:rPr>
-                <a:t>המודל </a:t>
-              </a:r>
-              <a:r>
-                <a:rPr lang="en-US" b="true" sz="2000">
-                  <a:solidFill>
-                    <a:srgbClr val="333333"/>
-                  </a:solidFill>
-                  <a:latin typeface="Carlito Bold"/>
-                  <a:ea typeface="Carlito Bold"/>
-                  <a:cs typeface="Carlito Bold"/>
-                  <a:sym typeface="Carlito Bold"/>
+                <a:t>המלצה לבוט מיון חירום רפואי: </a:t>
+              </a:r>
+              <a:r>
+                <a:rPr lang="en-US" sz="2000">
+                  <a:solidFill>
+                    <a:srgbClr val="333333"/>
+                  </a:solidFill>
+                  <a:latin typeface="Carlito"/>
+                  <a:ea typeface="Carlito"/>
+                  <a:cs typeface="Carlito"/>
+                  <a:sym typeface="Carlito"/>
+                </a:rPr>
+                <a:t>GPT-5.2</a:t>
+              </a:r>
+              <a:r>
+                <a:rPr lang="he-IL" sz="2000">
+                  <a:solidFill>
+                    <a:srgbClr val="333333"/>
+                  </a:solidFill>
+                  <a:latin typeface="Carlito"/>
+                  <a:ea typeface="Carlito"/>
+                  <a:cs typeface="Carlito"/>
+                  <a:sym typeface="Carlito"/>
+                  <a:rtl val="true"/>
+                </a:rPr>
+                <a:t> או </a:t>
+              </a:r>
+              <a:r>
+                <a:rPr lang="en-US" sz="2000">
+                  <a:solidFill>
+                    <a:srgbClr val="333333"/>
+                  </a:solidFill>
+                  <a:latin typeface="Carlito"/>
+                  <a:ea typeface="Carlito"/>
+                  <a:cs typeface="Carlito"/>
+                  <a:sym typeface="Carlito"/>
                 </a:rPr>
                 <a:t>GPT-4o</a:t>
-              </a:r>
-              <a:r>
-                <a:rPr lang="he-IL" sz="2000">
-                  <a:solidFill>
-                    <a:srgbClr val="333333"/>
-                  </a:solidFill>
-                  <a:latin typeface="Carlito"/>
-                  <a:ea typeface="Carlito"/>
-                  <a:cs typeface="Carlito"/>
-                  <a:sym typeface="Carlito"/>
-                  <a:rtl val="true"/>
-                </a:rPr>
-                <a:t> מומלץ לשימוש במיון רפואי בזכות דיוק המידע ויכולת ניתוח גבוהה.</a:t>
-              </a:r>
-            </a:p>
-            <a:p>
-              <a:pPr algn="r" rtl="true" marL="0" indent="0" lvl="0">
-                <a:lnSpc>
-                  <a:spcPts val="2400"/>
-                </a:lnSpc>
-              </a:pPr>
-              <a:r>
-                <a:rPr lang="he-IL" sz="2000">
-                  <a:solidFill>
-                    <a:srgbClr val="333333"/>
-                  </a:solidFill>
-                  <a:latin typeface="Carlito"/>
-                  <a:ea typeface="Carlito"/>
-                  <a:cs typeface="Carlito"/>
-                  <a:sym typeface="Carlito"/>
-                  <a:rtl val="true"/>
-                </a:rPr>
-                <a:t>כאופציה חלופית, </a:t>
-              </a:r>
-              <a:r>
-                <a:rPr lang="en-US" b="true" sz="2000">
-                  <a:solidFill>
-                    <a:srgbClr val="333333"/>
-                  </a:solidFill>
-                  <a:latin typeface="Carlito Bold"/>
-                  <a:ea typeface="Carlito Bold"/>
-                  <a:cs typeface="Carlito Bold"/>
-                  <a:sym typeface="Carlito Bold"/>
-                </a:rPr>
-                <a:t>GPT-4o Mini</a:t>
-              </a:r>
-              <a:r>
-                <a:rPr lang="he-IL" sz="2000">
-                  <a:solidFill>
-                    <a:srgbClr val="333333"/>
-                  </a:solidFill>
-                  <a:latin typeface="Carlito"/>
-                  <a:ea typeface="Carlito"/>
-                  <a:cs typeface="Carlito"/>
-                  <a:sym typeface="Carlito"/>
-                  <a:rtl val="true"/>
-                </a:rPr>
-                <a:t> מציע פתרונות טובים לשאלות בסיכון נמוך, תוך שמירה על עלויות נמוכות.</a:t>
               </a:r>
             </a:p>
             <a:p>
@@ -7936,12 +8816,174 @@
                 </a:lnSpc>
               </a:pPr>
             </a:p>
+            <a:p>
+              <a:pPr algn="r" rtl="true" marL="0" indent="0" lvl="0">
+                <a:lnSpc>
+                  <a:spcPts val="2400"/>
+                </a:lnSpc>
+              </a:pPr>
+              <a:r>
+                <a:rPr lang="he-IL" sz="2000">
+                  <a:solidFill>
+                    <a:srgbClr val="333333"/>
+                  </a:solidFill>
+                  <a:latin typeface="Carlito"/>
+                  <a:ea typeface="Carlito"/>
+                  <a:cs typeface="Carlito"/>
+                  <a:sym typeface="Carlito"/>
+                  <a:rtl val="true"/>
+                </a:rPr>
+                <a:t>המודל </a:t>
+              </a:r>
+              <a:r>
+                <a:rPr lang="en-US" sz="2000">
+                  <a:solidFill>
+                    <a:srgbClr val="333333"/>
+                  </a:solidFill>
+                  <a:latin typeface="Carlito"/>
+                  <a:ea typeface="Carlito"/>
+                  <a:cs typeface="Carlito"/>
+                  <a:sym typeface="Carlito"/>
+                </a:rPr>
+                <a:t>GPT-5.2</a:t>
+              </a:r>
+              <a:r>
+                <a:rPr lang="he-IL" sz="2000">
+                  <a:solidFill>
+                    <a:srgbClr val="333333"/>
+                  </a:solidFill>
+                  <a:latin typeface="Carlito"/>
+                  <a:ea typeface="Carlito"/>
+                  <a:cs typeface="Carlito"/>
+                  <a:sym typeface="Carlito"/>
+                  <a:rtl val="true"/>
+                </a:rPr>
+                <a:t> מומלץ אם התקציב מאפשר - דיוק מקסימלי קריטי בהחלטות רפואיות.</a:t>
+              </a:r>
+            </a:p>
+            <a:p>
+              <a:pPr algn="r" rtl="true" marL="0" indent="0" lvl="0">
+                <a:lnSpc>
+                  <a:spcPts val="2400"/>
+                </a:lnSpc>
+              </a:pPr>
+            </a:p>
+            <a:p>
+              <a:pPr algn="r" rtl="true" marL="0" indent="0" lvl="0">
+                <a:lnSpc>
+                  <a:spcPts val="2400"/>
+                </a:lnSpc>
+              </a:pPr>
+              <a:r>
+                <a:rPr lang="he-IL" sz="2000">
+                  <a:solidFill>
+                    <a:srgbClr val="333333"/>
+                  </a:solidFill>
+                  <a:latin typeface="Carlito"/>
+                  <a:ea typeface="Carlito"/>
+                  <a:cs typeface="Carlito"/>
+                  <a:sym typeface="Carlito"/>
+                  <a:rtl val="true"/>
+                </a:rPr>
+                <a:t>כאופציה חלופית, </a:t>
+              </a:r>
+              <a:r>
+                <a:rPr lang="en-US" sz="2000">
+                  <a:solidFill>
+                    <a:srgbClr val="333333"/>
+                  </a:solidFill>
+                  <a:latin typeface="Carlito"/>
+                  <a:ea typeface="Carlito"/>
+                  <a:cs typeface="Carlito"/>
+                  <a:sym typeface="Carlito"/>
+                </a:rPr>
+                <a:t>GPT-4o</a:t>
+              </a:r>
+              <a:r>
+                <a:rPr lang="ar-EG" sz="2000">
+                  <a:solidFill>
+                    <a:srgbClr val="333333"/>
+                  </a:solidFill>
+                  <a:latin typeface="Carlito"/>
+                  <a:ea typeface="Carlito"/>
+                  <a:cs typeface="Carlito"/>
+                  <a:sym typeface="Carlito"/>
+                  <a:rtl val="true"/>
+                </a:rPr>
+                <a:t> </a:t>
+              </a:r>
+              <a:r>
+                <a:rPr lang="he-IL" sz="2000">
+                  <a:solidFill>
+                    <a:srgbClr val="333333"/>
+                  </a:solidFill>
+                  <a:latin typeface="Carlito"/>
+                  <a:ea typeface="Carlito"/>
+                  <a:cs typeface="Carlito"/>
+                  <a:sym typeface="Carlito"/>
+                  <a:rtl val="true"/>
+                </a:rPr>
+                <a:t>מציע ביצועים מצוינים עם עלות נמוכה יותר, ומתאים לשאילתות בסיכון נמוך.</a:t>
+              </a:r>
+            </a:p>
+            <a:p>
+              <a:pPr algn="r" rtl="true" marL="0" indent="0" lvl="0">
+                <a:lnSpc>
+                  <a:spcPts val="2400"/>
+                </a:lnSpc>
+              </a:pPr>
+            </a:p>
+            <a:p>
+              <a:pPr algn="r" rtl="true" marL="0" indent="0" lvl="0">
+                <a:lnSpc>
+                  <a:spcPts val="2400"/>
+                </a:lnSpc>
+              </a:pPr>
+              <a:r>
+                <a:rPr lang="he-IL" sz="2000">
+                  <a:solidFill>
+                    <a:srgbClr val="333333"/>
+                  </a:solidFill>
+                  <a:latin typeface="Carlito"/>
+                  <a:ea typeface="Carlito"/>
+                  <a:cs typeface="Carlito"/>
+                  <a:sym typeface="Carlito"/>
+                  <a:rtl val="true"/>
+                </a:rPr>
+                <a:t>לסיכום: עבור בוט מיון חירום - נשתמש ב-</a:t>
+              </a:r>
+              <a:r>
+                <a:rPr lang="en-US" sz="2000">
+                  <a:solidFill>
+                    <a:srgbClr val="333333"/>
+                  </a:solidFill>
+                  <a:latin typeface="Carlito"/>
+                  <a:ea typeface="Carlito"/>
+                  <a:cs typeface="Carlito"/>
+                  <a:sym typeface="Carlito"/>
+                </a:rPr>
+                <a:t>GPT-5.2</a:t>
+              </a:r>
+              <a:r>
+                <a:rPr lang="ar-EG" sz="2000">
+                  <a:solidFill>
+                    <a:srgbClr val="333333"/>
+                  </a:solidFill>
+                  <a:latin typeface="Carlito"/>
+                  <a:ea typeface="Carlito"/>
+                  <a:cs typeface="Carlito"/>
+                  <a:sym typeface="Carlito"/>
+                  <a:rtl val="true"/>
+                </a:rPr>
+                <a:t>.</a:t>
+              </a:r>
+            </a:p>
           </p:txBody>
         </p:sp>
       </p:grpSp>
       <p:grpSp>
         <p:nvGrpSpPr>
-          <p:cNvPr name="Group 9" id="9"/>
+          <p:cNvPr name="Group 7" id="7"/>
           <p:cNvGrpSpPr/>
           <p:nvPr/>
         </p:nvGrpSpPr>
@@ -7955,7 +8997,7 @@
         </p:grpSpPr>
         <p:sp>
           <p:nvSpPr>
-            <p:cNvPr name="Freeform 10" id="10"/>
+            <p:cNvPr name="Freeform 8" id="8"/>
             <p:cNvSpPr/>
             <p:nvPr/>
           </p:nvSpPr>
@@ -8091,7 +9133,7 @@
         </p:sp>
         <p:sp>
           <p:nvSpPr>
-            <p:cNvPr name="TextBox 11" id="11"/>
+            <p:cNvPr name="TextBox 9" id="9"/>
             <p:cNvSpPr txBox="true"/>
             <p:nvPr/>
           </p:nvSpPr>
@@ -8120,6 +9162,52 @@
           </p:txBody>
         </p:sp>
       </p:grpSp>
+      <p:sp>
+        <p:nvSpPr>
+          <p:cNvPr name="Freeform 10" id="10"/>
+          <p:cNvSpPr/>
+          <p:nvPr/>
+        </p:nvSpPr>
+        <p:spPr>
+          <a:xfrm flipH="false" flipV="false" rot="0">
+            <a:off x="0" y="1701965"/>
+            <a:ext cx="8573028" cy="8585035"/>
+          </a:xfrm>
+          <a:custGeom>
+            <a:avLst/>
+            <a:gdLst/>
+            <a:ahLst/>
+            <a:cxnLst/>
+            <a:rect r="r" b="b" t="t" l="l"/>
+            <a:pathLst>
+              <a:path h="8585035" w="8573028">
+                <a:moveTo>
+                  <a:pt x="0" y="0"/>
+                </a:moveTo>
+                <a:lnTo>
+                  <a:pt x="8573028" y="0"/>
+                </a:lnTo>
+                <a:lnTo>
+                  <a:pt x="8573028" y="8585035"/>
+                </a:lnTo>
+                <a:lnTo>
+                  <a:pt x="0" y="8585035"/>
+                </a:lnTo>
+                <a:lnTo>
+                  <a:pt x="0" y="0"/>
+                </a:lnTo>
+                <a:close/>
+              </a:path>
+            </a:pathLst>
+          </a:custGeom>
+          <a:blipFill>
+            <a:blip r:embed="rId2"/>
+            <a:stretch>
+              <a:fillRect l="0" t="0" r="0" b="0"/>
+            </a:stretch>
+          </a:blipFill>
+        </p:spPr>
+      </p:sp>
     </p:spTree>
   </p:cSld>
   <p:clrMapOvr>

</xml_diff>